<commit_message>
update figures and code
</commit_message>
<xml_diff>
--- a/post simulation/Figures_PLOSOne.pptx
+++ b/post simulation/Figures_PLOSOne.pptx
@@ -7,6 +7,7 @@
   <p:sldIdLst>
     <p:sldId id="257" r:id="rId2"/>
     <p:sldId id="258" r:id="rId3"/>
+    <p:sldId id="259" r:id="rId4"/>
   </p:sldIdLst>
   <p:sldSz cx="12192000" cy="6858000"/>
   <p:notesSz cx="6858000" cy="9144000"/>
@@ -262,7 +263,7 @@
           <a:p>
             <a:fld id="{D15581DD-6498-6F4E-B0E4-665F625111A1}" type="datetimeFigureOut">
               <a:rPr lang="en-GB" smtClean="0"/>
-              <a:t>14/02/2024</a:t>
+              <a:t>15/02/2024</a:t>
             </a:fld>
             <a:endParaRPr lang="en-GB"/>
           </a:p>
@@ -462,7 +463,7 @@
           <a:p>
             <a:fld id="{D15581DD-6498-6F4E-B0E4-665F625111A1}" type="datetimeFigureOut">
               <a:rPr lang="en-GB" smtClean="0"/>
-              <a:t>14/02/2024</a:t>
+              <a:t>15/02/2024</a:t>
             </a:fld>
             <a:endParaRPr lang="en-GB"/>
           </a:p>
@@ -672,7 +673,7 @@
           <a:p>
             <a:fld id="{D15581DD-6498-6F4E-B0E4-665F625111A1}" type="datetimeFigureOut">
               <a:rPr lang="en-GB" smtClean="0"/>
-              <a:t>14/02/2024</a:t>
+              <a:t>15/02/2024</a:t>
             </a:fld>
             <a:endParaRPr lang="en-GB"/>
           </a:p>
@@ -872,7 +873,7 @@
           <a:p>
             <a:fld id="{D15581DD-6498-6F4E-B0E4-665F625111A1}" type="datetimeFigureOut">
               <a:rPr lang="en-GB" smtClean="0"/>
-              <a:t>14/02/2024</a:t>
+              <a:t>15/02/2024</a:t>
             </a:fld>
             <a:endParaRPr lang="en-GB"/>
           </a:p>
@@ -1148,7 +1149,7 @@
           <a:p>
             <a:fld id="{D15581DD-6498-6F4E-B0E4-665F625111A1}" type="datetimeFigureOut">
               <a:rPr lang="en-GB" smtClean="0"/>
-              <a:t>14/02/2024</a:t>
+              <a:t>15/02/2024</a:t>
             </a:fld>
             <a:endParaRPr lang="en-GB"/>
           </a:p>
@@ -1416,7 +1417,7 @@
           <a:p>
             <a:fld id="{D15581DD-6498-6F4E-B0E4-665F625111A1}" type="datetimeFigureOut">
               <a:rPr lang="en-GB" smtClean="0"/>
-              <a:t>14/02/2024</a:t>
+              <a:t>15/02/2024</a:t>
             </a:fld>
             <a:endParaRPr lang="en-GB"/>
           </a:p>
@@ -1831,7 +1832,7 @@
           <a:p>
             <a:fld id="{D15581DD-6498-6F4E-B0E4-665F625111A1}" type="datetimeFigureOut">
               <a:rPr lang="en-GB" smtClean="0"/>
-              <a:t>14/02/2024</a:t>
+              <a:t>15/02/2024</a:t>
             </a:fld>
             <a:endParaRPr lang="en-GB"/>
           </a:p>
@@ -1973,7 +1974,7 @@
           <a:p>
             <a:fld id="{D15581DD-6498-6F4E-B0E4-665F625111A1}" type="datetimeFigureOut">
               <a:rPr lang="en-GB" smtClean="0"/>
-              <a:t>14/02/2024</a:t>
+              <a:t>15/02/2024</a:t>
             </a:fld>
             <a:endParaRPr lang="en-GB"/>
           </a:p>
@@ -2086,7 +2087,7 @@
           <a:p>
             <a:fld id="{D15581DD-6498-6F4E-B0E4-665F625111A1}" type="datetimeFigureOut">
               <a:rPr lang="en-GB" smtClean="0"/>
-              <a:t>14/02/2024</a:t>
+              <a:t>15/02/2024</a:t>
             </a:fld>
             <a:endParaRPr lang="en-GB"/>
           </a:p>
@@ -2399,7 +2400,7 @@
           <a:p>
             <a:fld id="{D15581DD-6498-6F4E-B0E4-665F625111A1}" type="datetimeFigureOut">
               <a:rPr lang="en-GB" smtClean="0"/>
-              <a:t>14/02/2024</a:t>
+              <a:t>15/02/2024</a:t>
             </a:fld>
             <a:endParaRPr lang="en-GB"/>
           </a:p>
@@ -2688,7 +2689,7 @@
           <a:p>
             <a:fld id="{D15581DD-6498-6F4E-B0E4-665F625111A1}" type="datetimeFigureOut">
               <a:rPr lang="en-GB" smtClean="0"/>
-              <a:t>14/02/2024</a:t>
+              <a:t>15/02/2024</a:t>
             </a:fld>
             <a:endParaRPr lang="en-GB"/>
           </a:p>
@@ -2931,7 +2932,7 @@
           <a:p>
             <a:fld id="{D15581DD-6498-6F4E-B0E4-665F625111A1}" type="datetimeFigureOut">
               <a:rPr lang="en-GB" smtClean="0"/>
-              <a:t>14/02/2024</a:t>
+              <a:t>15/02/2024</a:t>
             </a:fld>
             <a:endParaRPr lang="en-GB"/>
           </a:p>
@@ -3350,10 +3351,10 @@
       </p:grpSpPr>
       <p:pic>
         <p:nvPicPr>
-          <p:cNvPr id="11" name="그림 10" descr="라인, 그래프, 도표, 경사이(가) 표시된 사진&#10;&#10;자동 생성된 설명">
-            <a:extLst>
-              <a:ext uri="{FF2B5EF4-FFF2-40B4-BE49-F238E27FC236}">
-                <a16:creationId xmlns:a16="http://schemas.microsoft.com/office/drawing/2014/main" id="{0A8FD27C-B3C6-87BF-B87E-651A2EFA014F}"/>
+          <p:cNvPr id="3" name="그림 2" descr="라인, 그래프, 도표, 텍스트이(가) 표시된 사진&#10;&#10;자동 생성된 설명">
+            <a:extLst>
+              <a:ext uri="{FF2B5EF4-FFF2-40B4-BE49-F238E27FC236}">
+                <a16:creationId xmlns:a16="http://schemas.microsoft.com/office/drawing/2014/main" id="{371A00D0-A0E4-F231-B3EE-65CA3C1DED5A}"/>
               </a:ext>
             </a:extLst>
           </p:cNvPr>
@@ -3370,8 +3371,8 @@
         </p:blipFill>
         <p:spPr>
           <a:xfrm>
-            <a:off x="3921629" y="669267"/>
-            <a:ext cx="6715496" cy="3837426"/>
+            <a:off x="3880955" y="-402709"/>
+            <a:ext cx="6573835" cy="3944301"/>
           </a:xfrm>
           <a:prstGeom prst="rect">
             <a:avLst/>
@@ -3392,7 +3393,7 @@
         </p:nvSpPr>
         <p:spPr>
           <a:xfrm>
-            <a:off x="3314403" y="844731"/>
+            <a:off x="3293383" y="-164262"/>
             <a:ext cx="522514" cy="646331"/>
           </a:xfrm>
           <a:prstGeom prst="rect">
@@ -3431,7 +3432,7 @@
         </p:nvSpPr>
         <p:spPr>
           <a:xfrm>
-            <a:off x="2915391" y="3956804"/>
+            <a:off x="3293383" y="2895261"/>
             <a:ext cx="522514" cy="646331"/>
           </a:xfrm>
           <a:prstGeom prst="rect">
@@ -3478,7 +3479,7 @@
         </p:blipFill>
         <p:spPr>
           <a:xfrm>
-            <a:off x="2939143" y="4423568"/>
+            <a:off x="2939143" y="3414575"/>
             <a:ext cx="7772400" cy="3454400"/>
           </a:xfrm>
           <a:prstGeom prst="rect">
@@ -3500,7 +3501,7 @@
         </p:nvSpPr>
         <p:spPr>
           <a:xfrm>
-            <a:off x="5090462" y="7413878"/>
+            <a:off x="5090462" y="6404885"/>
             <a:ext cx="795871" cy="400110"/>
           </a:xfrm>
           <a:prstGeom prst="rect">
@@ -3539,7 +3540,7 @@
         </p:nvSpPr>
         <p:spPr>
           <a:xfrm>
-            <a:off x="8241604" y="7413878"/>
+            <a:off x="8241604" y="6404885"/>
             <a:ext cx="795871" cy="400110"/>
           </a:xfrm>
           <a:prstGeom prst="rect">
@@ -3593,10 +3594,1452 @@
           <a:chExt cx="0" cy="0"/>
         </a:xfrm>
       </p:grpSpPr>
+      <p:pic>
+        <p:nvPicPr>
+          <p:cNvPr id="5" name="그림 4">
+            <a:extLst>
+              <a:ext uri="{FF2B5EF4-FFF2-40B4-BE49-F238E27FC236}">
+                <a16:creationId xmlns:a16="http://schemas.microsoft.com/office/drawing/2014/main" id="{1C6241C5-777F-307F-AC6A-83F243409035}"/>
+              </a:ext>
+            </a:extLst>
+          </p:cNvPr>
+          <p:cNvPicPr>
+            <a:picLocks noChangeAspect="1"/>
+          </p:cNvPicPr>
+          <p:nvPr/>
+        </p:nvPicPr>
+        <p:blipFill>
+          <a:blip r:embed="rId2"/>
+          <a:srcRect/>
+          <a:stretch/>
+        </p:blipFill>
+        <p:spPr>
+          <a:xfrm>
+            <a:off x="918634" y="660400"/>
+            <a:ext cx="7772400" cy="5181600"/>
+          </a:xfrm>
+          <a:prstGeom prst="rect">
+            <a:avLst/>
+          </a:prstGeom>
+        </p:spPr>
+      </p:pic>
+      <p:sp>
+        <p:nvSpPr>
+          <p:cNvPr id="19" name="TextBox 18">
+            <a:extLst>
+              <a:ext uri="{FF2B5EF4-FFF2-40B4-BE49-F238E27FC236}">
+                <a16:creationId xmlns:a16="http://schemas.microsoft.com/office/drawing/2014/main" id="{439F3BA7-3C85-7497-41D6-44EA8EB7E93C}"/>
+              </a:ext>
+            </a:extLst>
+          </p:cNvPr>
+          <p:cNvSpPr txBox="1"/>
+          <p:nvPr/>
+        </p:nvSpPr>
+        <p:spPr>
+          <a:xfrm>
+            <a:off x="6758758" y="941274"/>
+            <a:ext cx="1793450" cy="646331"/>
+          </a:xfrm>
+          <a:prstGeom prst="rect">
+            <a:avLst/>
+          </a:prstGeom>
+          <a:noFill/>
+        </p:spPr>
+        <p:txBody>
+          <a:bodyPr wrap="square" rtlCol="0">
+            <a:spAutoFit/>
+          </a:bodyPr>
+          <a:lstStyle/>
+          <a:p>
+            <a:r>
+              <a:rPr lang="en-GB" altLang="ko-GB" dirty="0">
+                <a:solidFill>
+                  <a:schemeClr val="tx1">
+                    <a:lumMod val="75000"/>
+                    <a:lumOff val="25000"/>
+                  </a:schemeClr>
+                </a:solidFill>
+                <a:latin typeface="Roboto Condensed" pitchFamily="2" charset="0"/>
+                <a:ea typeface="Roboto Condensed" pitchFamily="2" charset="0"/>
+                <a:cs typeface="Arial" panose="020B0604020202020204" pitchFamily="34" charset="0"/>
+              </a:rPr>
+              <a:t>Mean </a:t>
+            </a:r>
+            <a:r>
+              <a:rPr lang="en-GB" dirty="0">
+                <a:solidFill>
+                  <a:schemeClr val="tx1">
+                    <a:lumMod val="75000"/>
+                    <a:lumOff val="25000"/>
+                  </a:schemeClr>
+                </a:solidFill>
+                <a:latin typeface="Roboto Condensed" pitchFamily="2" charset="0"/>
+                <a:ea typeface="Roboto Condensed" pitchFamily="2" charset="0"/>
+                <a:cs typeface="Arial" panose="020B0604020202020204" pitchFamily="34" charset="0"/>
+              </a:rPr>
+              <a:t>Abs Diff: 17.7µg/m</a:t>
+            </a:r>
+            <a:r>
+              <a:rPr lang="en-GB" baseline="30000" dirty="0">
+                <a:solidFill>
+                  <a:schemeClr val="tx1">
+                    <a:lumMod val="75000"/>
+                    <a:lumOff val="25000"/>
+                  </a:schemeClr>
+                </a:solidFill>
+                <a:latin typeface="Roboto Condensed" pitchFamily="2" charset="0"/>
+                <a:ea typeface="Roboto Condensed" pitchFamily="2" charset="0"/>
+                <a:cs typeface="Arial" panose="020B0604020202020204" pitchFamily="34" charset="0"/>
+              </a:rPr>
+              <a:t>3</a:t>
+            </a:r>
+          </a:p>
+        </p:txBody>
+      </p:sp>
+      <p:cxnSp>
+        <p:nvCxnSpPr>
+          <p:cNvPr id="21" name="직선 연결선[R] 20">
+            <a:extLst>
+              <a:ext uri="{FF2B5EF4-FFF2-40B4-BE49-F238E27FC236}">
+                <a16:creationId xmlns:a16="http://schemas.microsoft.com/office/drawing/2014/main" id="{63DF9684-5474-8DCE-CCB0-ECB27ED9B4B8}"/>
+              </a:ext>
+            </a:extLst>
+          </p:cNvPr>
+          <p:cNvCxnSpPr/>
+          <p:nvPr/>
+        </p:nvCxnSpPr>
+        <p:spPr>
+          <a:xfrm>
+            <a:off x="2531533" y="1884347"/>
+            <a:ext cx="0" cy="1773252"/>
+          </a:xfrm>
+          <a:prstGeom prst="line">
+            <a:avLst/>
+          </a:prstGeom>
+          <a:ln w="12700">
+            <a:solidFill>
+              <a:schemeClr val="tx1"/>
+            </a:solidFill>
+            <a:prstDash val="dash"/>
+          </a:ln>
+        </p:spPr>
+        <p:style>
+          <a:lnRef idx="1">
+            <a:schemeClr val="accent1"/>
+          </a:lnRef>
+          <a:fillRef idx="0">
+            <a:schemeClr val="accent1"/>
+          </a:fillRef>
+          <a:effectRef idx="0">
+            <a:schemeClr val="accent1"/>
+          </a:effectRef>
+          <a:fontRef idx="minor">
+            <a:schemeClr val="tx1"/>
+          </a:fontRef>
+        </p:style>
+      </p:cxnSp>
+      <p:cxnSp>
+        <p:nvCxnSpPr>
+          <p:cNvPr id="22" name="직선 연결선[R] 21">
+            <a:extLst>
+              <a:ext uri="{FF2B5EF4-FFF2-40B4-BE49-F238E27FC236}">
+                <a16:creationId xmlns:a16="http://schemas.microsoft.com/office/drawing/2014/main" id="{A7FE4A85-D3C5-E271-31A5-0CF9E7420703}"/>
+              </a:ext>
+            </a:extLst>
+          </p:cNvPr>
+          <p:cNvCxnSpPr/>
+          <p:nvPr/>
+        </p:nvCxnSpPr>
+        <p:spPr>
+          <a:xfrm>
+            <a:off x="1972733" y="1029214"/>
+            <a:ext cx="0" cy="1773252"/>
+          </a:xfrm>
+          <a:prstGeom prst="line">
+            <a:avLst/>
+          </a:prstGeom>
+          <a:ln w="12700">
+            <a:solidFill>
+              <a:schemeClr val="tx1"/>
+            </a:solidFill>
+            <a:prstDash val="dash"/>
+          </a:ln>
+        </p:spPr>
+        <p:style>
+          <a:lnRef idx="1">
+            <a:schemeClr val="accent1"/>
+          </a:lnRef>
+          <a:fillRef idx="0">
+            <a:schemeClr val="accent1"/>
+          </a:fillRef>
+          <a:effectRef idx="0">
+            <a:schemeClr val="accent1"/>
+          </a:effectRef>
+          <a:fontRef idx="minor">
+            <a:schemeClr val="tx1"/>
+          </a:fontRef>
+        </p:style>
+      </p:cxnSp>
+      <p:cxnSp>
+        <p:nvCxnSpPr>
+          <p:cNvPr id="23" name="직선 연결선[R] 22">
+            <a:extLst>
+              <a:ext uri="{FF2B5EF4-FFF2-40B4-BE49-F238E27FC236}">
+                <a16:creationId xmlns:a16="http://schemas.microsoft.com/office/drawing/2014/main" id="{A04E5C42-506C-4C4D-29B7-881E95F0DBC0}"/>
+              </a:ext>
+            </a:extLst>
+          </p:cNvPr>
+          <p:cNvCxnSpPr/>
+          <p:nvPr/>
+        </p:nvCxnSpPr>
+        <p:spPr>
+          <a:xfrm>
+            <a:off x="3090333" y="2132115"/>
+            <a:ext cx="0" cy="1773252"/>
+          </a:xfrm>
+          <a:prstGeom prst="line">
+            <a:avLst/>
+          </a:prstGeom>
+          <a:ln w="12700">
+            <a:solidFill>
+              <a:schemeClr val="tx1"/>
+            </a:solidFill>
+            <a:prstDash val="dash"/>
+          </a:ln>
+        </p:spPr>
+        <p:style>
+          <a:lnRef idx="1">
+            <a:schemeClr val="accent1"/>
+          </a:lnRef>
+          <a:fillRef idx="0">
+            <a:schemeClr val="accent1"/>
+          </a:fillRef>
+          <a:effectRef idx="0">
+            <a:schemeClr val="accent1"/>
+          </a:effectRef>
+          <a:fontRef idx="minor">
+            <a:schemeClr val="tx1"/>
+          </a:fontRef>
+        </p:style>
+      </p:cxnSp>
+      <p:cxnSp>
+        <p:nvCxnSpPr>
+          <p:cNvPr id="24" name="직선 연결선[R] 23">
+            <a:extLst>
+              <a:ext uri="{FF2B5EF4-FFF2-40B4-BE49-F238E27FC236}">
+                <a16:creationId xmlns:a16="http://schemas.microsoft.com/office/drawing/2014/main" id="{FBC4ACB2-7010-723E-2035-9F9FE67CDA99}"/>
+              </a:ext>
+            </a:extLst>
+          </p:cNvPr>
+          <p:cNvCxnSpPr/>
+          <p:nvPr/>
+        </p:nvCxnSpPr>
+        <p:spPr>
+          <a:xfrm>
+            <a:off x="3674533" y="1471715"/>
+            <a:ext cx="0" cy="1773252"/>
+          </a:xfrm>
+          <a:prstGeom prst="line">
+            <a:avLst/>
+          </a:prstGeom>
+          <a:ln w="12700">
+            <a:solidFill>
+              <a:schemeClr val="tx1"/>
+            </a:solidFill>
+            <a:prstDash val="dash"/>
+          </a:ln>
+        </p:spPr>
+        <p:style>
+          <a:lnRef idx="1">
+            <a:schemeClr val="accent1"/>
+          </a:lnRef>
+          <a:fillRef idx="0">
+            <a:schemeClr val="accent1"/>
+          </a:fillRef>
+          <a:effectRef idx="0">
+            <a:schemeClr val="accent1"/>
+          </a:effectRef>
+          <a:fontRef idx="minor">
+            <a:schemeClr val="tx1"/>
+          </a:fontRef>
+        </p:style>
+      </p:cxnSp>
+      <p:cxnSp>
+        <p:nvCxnSpPr>
+          <p:cNvPr id="25" name="직선 연결선[R] 24">
+            <a:extLst>
+              <a:ext uri="{FF2B5EF4-FFF2-40B4-BE49-F238E27FC236}">
+                <a16:creationId xmlns:a16="http://schemas.microsoft.com/office/drawing/2014/main" id="{EBC41512-0BB6-AEB0-9FC1-846D3DAB9AEC}"/>
+              </a:ext>
+            </a:extLst>
+          </p:cNvPr>
+          <p:cNvCxnSpPr/>
+          <p:nvPr/>
+        </p:nvCxnSpPr>
+        <p:spPr>
+          <a:xfrm>
+            <a:off x="4258733" y="2352251"/>
+            <a:ext cx="0" cy="1476000"/>
+          </a:xfrm>
+          <a:prstGeom prst="line">
+            <a:avLst/>
+          </a:prstGeom>
+          <a:ln w="12700">
+            <a:solidFill>
+              <a:schemeClr val="tx1"/>
+            </a:solidFill>
+            <a:prstDash val="dash"/>
+          </a:ln>
+        </p:spPr>
+        <p:style>
+          <a:lnRef idx="1">
+            <a:schemeClr val="accent1"/>
+          </a:lnRef>
+          <a:fillRef idx="0">
+            <a:schemeClr val="accent1"/>
+          </a:fillRef>
+          <a:effectRef idx="0">
+            <a:schemeClr val="accent1"/>
+          </a:effectRef>
+          <a:fontRef idx="minor">
+            <a:schemeClr val="tx1"/>
+          </a:fontRef>
+        </p:style>
+      </p:cxnSp>
+      <p:cxnSp>
+        <p:nvCxnSpPr>
+          <p:cNvPr id="26" name="직선 연결선[R] 25">
+            <a:extLst>
+              <a:ext uri="{FF2B5EF4-FFF2-40B4-BE49-F238E27FC236}">
+                <a16:creationId xmlns:a16="http://schemas.microsoft.com/office/drawing/2014/main" id="{17EC8B26-147B-42D1-3115-4DFB6410A891}"/>
+              </a:ext>
+            </a:extLst>
+          </p:cNvPr>
+          <p:cNvCxnSpPr/>
+          <p:nvPr/>
+        </p:nvCxnSpPr>
+        <p:spPr>
+          <a:xfrm>
+            <a:off x="4834465" y="3590617"/>
+            <a:ext cx="0" cy="1116000"/>
+          </a:xfrm>
+          <a:prstGeom prst="line">
+            <a:avLst/>
+          </a:prstGeom>
+          <a:ln w="12700">
+            <a:solidFill>
+              <a:schemeClr val="tx1"/>
+            </a:solidFill>
+            <a:prstDash val="dash"/>
+          </a:ln>
+        </p:spPr>
+        <p:style>
+          <a:lnRef idx="1">
+            <a:schemeClr val="accent1"/>
+          </a:lnRef>
+          <a:fillRef idx="0">
+            <a:schemeClr val="accent1"/>
+          </a:fillRef>
+          <a:effectRef idx="0">
+            <a:schemeClr val="accent1"/>
+          </a:effectRef>
+          <a:fontRef idx="minor">
+            <a:schemeClr val="tx1"/>
+          </a:fontRef>
+        </p:style>
+      </p:cxnSp>
+      <p:cxnSp>
+        <p:nvCxnSpPr>
+          <p:cNvPr id="27" name="직선 연결선[R] 26">
+            <a:extLst>
+              <a:ext uri="{FF2B5EF4-FFF2-40B4-BE49-F238E27FC236}">
+                <a16:creationId xmlns:a16="http://schemas.microsoft.com/office/drawing/2014/main" id="{0016A5AB-C7BD-7538-2F52-7AD9C144B583}"/>
+              </a:ext>
+            </a:extLst>
+          </p:cNvPr>
+          <p:cNvCxnSpPr/>
+          <p:nvPr/>
+        </p:nvCxnSpPr>
+        <p:spPr>
+          <a:xfrm>
+            <a:off x="5401733" y="3122719"/>
+            <a:ext cx="0" cy="1332000"/>
+          </a:xfrm>
+          <a:prstGeom prst="line">
+            <a:avLst/>
+          </a:prstGeom>
+          <a:ln w="12700">
+            <a:solidFill>
+              <a:schemeClr val="tx1"/>
+            </a:solidFill>
+            <a:prstDash val="dash"/>
+          </a:ln>
+        </p:spPr>
+        <p:style>
+          <a:lnRef idx="1">
+            <a:schemeClr val="accent1"/>
+          </a:lnRef>
+          <a:fillRef idx="0">
+            <a:schemeClr val="accent1"/>
+          </a:fillRef>
+          <a:effectRef idx="0">
+            <a:schemeClr val="accent1"/>
+          </a:effectRef>
+          <a:fontRef idx="minor">
+            <a:schemeClr val="tx1"/>
+          </a:fontRef>
+        </p:style>
+      </p:cxnSp>
+      <p:cxnSp>
+        <p:nvCxnSpPr>
+          <p:cNvPr id="28" name="직선 연결선[R] 27">
+            <a:extLst>
+              <a:ext uri="{FF2B5EF4-FFF2-40B4-BE49-F238E27FC236}">
+                <a16:creationId xmlns:a16="http://schemas.microsoft.com/office/drawing/2014/main" id="{69C1BF8A-4064-9364-BBF1-D2FB1B763804}"/>
+              </a:ext>
+            </a:extLst>
+          </p:cNvPr>
+          <p:cNvCxnSpPr/>
+          <p:nvPr/>
+        </p:nvCxnSpPr>
+        <p:spPr>
+          <a:xfrm>
+            <a:off x="5985933" y="2493809"/>
+            <a:ext cx="0" cy="1224000"/>
+          </a:xfrm>
+          <a:prstGeom prst="line">
+            <a:avLst/>
+          </a:prstGeom>
+          <a:ln w="12700">
+            <a:solidFill>
+              <a:schemeClr val="tx1"/>
+            </a:solidFill>
+            <a:prstDash val="dash"/>
+          </a:ln>
+        </p:spPr>
+        <p:style>
+          <a:lnRef idx="1">
+            <a:schemeClr val="accent1"/>
+          </a:lnRef>
+          <a:fillRef idx="0">
+            <a:schemeClr val="accent1"/>
+          </a:fillRef>
+          <a:effectRef idx="0">
+            <a:schemeClr val="accent1"/>
+          </a:effectRef>
+          <a:fontRef idx="minor">
+            <a:schemeClr val="tx1"/>
+          </a:fontRef>
+        </p:style>
+      </p:cxnSp>
+      <p:cxnSp>
+        <p:nvCxnSpPr>
+          <p:cNvPr id="29" name="직선 연결선[R] 28">
+            <a:extLst>
+              <a:ext uri="{FF2B5EF4-FFF2-40B4-BE49-F238E27FC236}">
+                <a16:creationId xmlns:a16="http://schemas.microsoft.com/office/drawing/2014/main" id="{59A61A48-BAD8-44C0-F6EE-4A24247031BF}"/>
+              </a:ext>
+            </a:extLst>
+          </p:cNvPr>
+          <p:cNvCxnSpPr/>
+          <p:nvPr/>
+        </p:nvCxnSpPr>
+        <p:spPr>
+          <a:xfrm>
+            <a:off x="7128936" y="2897977"/>
+            <a:ext cx="0" cy="1548000"/>
+          </a:xfrm>
+          <a:prstGeom prst="line">
+            <a:avLst/>
+          </a:prstGeom>
+          <a:ln w="12700">
+            <a:solidFill>
+              <a:schemeClr val="tx1"/>
+            </a:solidFill>
+            <a:prstDash val="dash"/>
+          </a:ln>
+        </p:spPr>
+        <p:style>
+          <a:lnRef idx="1">
+            <a:schemeClr val="accent1"/>
+          </a:lnRef>
+          <a:fillRef idx="0">
+            <a:schemeClr val="accent1"/>
+          </a:fillRef>
+          <a:effectRef idx="0">
+            <a:schemeClr val="accent1"/>
+          </a:effectRef>
+          <a:fontRef idx="minor">
+            <a:schemeClr val="tx1"/>
+          </a:fontRef>
+        </p:style>
+      </p:cxnSp>
+      <p:cxnSp>
+        <p:nvCxnSpPr>
+          <p:cNvPr id="30" name="직선 연결선[R] 29">
+            <a:extLst>
+              <a:ext uri="{FF2B5EF4-FFF2-40B4-BE49-F238E27FC236}">
+                <a16:creationId xmlns:a16="http://schemas.microsoft.com/office/drawing/2014/main" id="{4609032E-0EA9-D479-C380-9C4100FCC8B5}"/>
+              </a:ext>
+            </a:extLst>
+          </p:cNvPr>
+          <p:cNvCxnSpPr/>
+          <p:nvPr/>
+        </p:nvCxnSpPr>
+        <p:spPr>
+          <a:xfrm>
+            <a:off x="6561668" y="2660906"/>
+            <a:ext cx="0" cy="1260000"/>
+          </a:xfrm>
+          <a:prstGeom prst="line">
+            <a:avLst/>
+          </a:prstGeom>
+          <a:ln w="12700">
+            <a:solidFill>
+              <a:schemeClr val="tx1"/>
+            </a:solidFill>
+            <a:prstDash val="dash"/>
+          </a:ln>
+        </p:spPr>
+        <p:style>
+          <a:lnRef idx="1">
+            <a:schemeClr val="accent1"/>
+          </a:lnRef>
+          <a:fillRef idx="0">
+            <a:schemeClr val="accent1"/>
+          </a:fillRef>
+          <a:effectRef idx="0">
+            <a:schemeClr val="accent1"/>
+          </a:effectRef>
+          <a:fontRef idx="minor">
+            <a:schemeClr val="tx1"/>
+          </a:fontRef>
+        </p:style>
+      </p:cxnSp>
+      <p:cxnSp>
+        <p:nvCxnSpPr>
+          <p:cNvPr id="31" name="직선 연결선[R] 30">
+            <a:extLst>
+              <a:ext uri="{FF2B5EF4-FFF2-40B4-BE49-F238E27FC236}">
+                <a16:creationId xmlns:a16="http://schemas.microsoft.com/office/drawing/2014/main" id="{5E950C17-BB0C-6C56-932E-3359BB5D53F4}"/>
+              </a:ext>
+            </a:extLst>
+          </p:cNvPr>
+          <p:cNvCxnSpPr/>
+          <p:nvPr/>
+        </p:nvCxnSpPr>
+        <p:spPr>
+          <a:xfrm>
+            <a:off x="7704668" y="2974173"/>
+            <a:ext cx="0" cy="1548000"/>
+          </a:xfrm>
+          <a:prstGeom prst="line">
+            <a:avLst/>
+          </a:prstGeom>
+          <a:ln w="12700">
+            <a:solidFill>
+              <a:schemeClr val="tx1"/>
+            </a:solidFill>
+            <a:prstDash val="dash"/>
+          </a:ln>
+        </p:spPr>
+        <p:style>
+          <a:lnRef idx="1">
+            <a:schemeClr val="accent1"/>
+          </a:lnRef>
+          <a:fillRef idx="0">
+            <a:schemeClr val="accent1"/>
+          </a:fillRef>
+          <a:effectRef idx="0">
+            <a:schemeClr val="accent1"/>
+          </a:effectRef>
+          <a:fontRef idx="minor">
+            <a:schemeClr val="tx1"/>
+          </a:fontRef>
+        </p:style>
+      </p:cxnSp>
+      <p:cxnSp>
+        <p:nvCxnSpPr>
+          <p:cNvPr id="32" name="직선 연결선[R] 31">
+            <a:extLst>
+              <a:ext uri="{FF2B5EF4-FFF2-40B4-BE49-F238E27FC236}">
+                <a16:creationId xmlns:a16="http://schemas.microsoft.com/office/drawing/2014/main" id="{15C7C235-CA0B-B3A5-F390-A6506547CE9A}"/>
+              </a:ext>
+            </a:extLst>
+          </p:cNvPr>
+          <p:cNvCxnSpPr/>
+          <p:nvPr/>
+        </p:nvCxnSpPr>
+        <p:spPr>
+          <a:xfrm>
+            <a:off x="8280402" y="2459942"/>
+            <a:ext cx="0" cy="1440000"/>
+          </a:xfrm>
+          <a:prstGeom prst="line">
+            <a:avLst/>
+          </a:prstGeom>
+          <a:ln w="12700">
+            <a:solidFill>
+              <a:schemeClr val="tx1"/>
+            </a:solidFill>
+            <a:prstDash val="dash"/>
+          </a:ln>
+        </p:spPr>
+        <p:style>
+          <a:lnRef idx="1">
+            <a:schemeClr val="accent1"/>
+          </a:lnRef>
+          <a:fillRef idx="0">
+            <a:schemeClr val="accent1"/>
+          </a:fillRef>
+          <a:effectRef idx="0">
+            <a:schemeClr val="accent1"/>
+          </a:effectRef>
+          <a:fontRef idx="minor">
+            <a:schemeClr val="tx1"/>
+          </a:fontRef>
+        </p:style>
+      </p:cxnSp>
+      <p:sp>
+        <p:nvSpPr>
+          <p:cNvPr id="6" name="TextBox 5">
+            <a:extLst>
+              <a:ext uri="{FF2B5EF4-FFF2-40B4-BE49-F238E27FC236}">
+                <a16:creationId xmlns:a16="http://schemas.microsoft.com/office/drawing/2014/main" id="{33D4B043-9AF3-688C-E726-70D3332AFE12}"/>
+              </a:ext>
+            </a:extLst>
+          </p:cNvPr>
+          <p:cNvSpPr txBox="1"/>
+          <p:nvPr/>
+        </p:nvSpPr>
+        <p:spPr>
+          <a:xfrm>
+            <a:off x="1698498" y="1824337"/>
+            <a:ext cx="540000" cy="324000"/>
+          </a:xfrm>
+          <a:prstGeom prst="roundRect">
+            <a:avLst/>
+          </a:prstGeom>
+          <a:solidFill>
+            <a:schemeClr val="bg1"/>
+          </a:solidFill>
+        </p:spPr>
+        <p:txBody>
+          <a:bodyPr wrap="square" rtlCol="0">
+            <a:spAutoFit/>
+          </a:bodyPr>
+          <a:lstStyle/>
+          <a:p>
+            <a:pPr algn="ctr"/>
+            <a:r>
+              <a:rPr lang="en-GB" sz="1400" dirty="0">
+                <a:solidFill>
+                  <a:schemeClr val="tx1">
+                    <a:lumMod val="75000"/>
+                    <a:lumOff val="25000"/>
+                  </a:schemeClr>
+                </a:solidFill>
+                <a:latin typeface="Roboto Condensed" pitchFamily="2" charset="0"/>
+                <a:ea typeface="Roboto Condensed" pitchFamily="2" charset="0"/>
+                <a:cs typeface="Arial" panose="020B0604020202020204" pitchFamily="34" charset="0"/>
+              </a:rPr>
+              <a:t>20.4</a:t>
+            </a:r>
+          </a:p>
+        </p:txBody>
+      </p:sp>
+      <p:sp>
+        <p:nvSpPr>
+          <p:cNvPr id="8" name="TextBox 7">
+            <a:extLst>
+              <a:ext uri="{FF2B5EF4-FFF2-40B4-BE49-F238E27FC236}">
+                <a16:creationId xmlns:a16="http://schemas.microsoft.com/office/drawing/2014/main" id="{E42C76CB-4113-54CD-95EB-E29B10C3887C}"/>
+              </a:ext>
+            </a:extLst>
+          </p:cNvPr>
+          <p:cNvSpPr txBox="1"/>
+          <p:nvPr/>
+        </p:nvSpPr>
+        <p:spPr>
+          <a:xfrm>
+            <a:off x="2256400" y="2577871"/>
+            <a:ext cx="540000" cy="324000"/>
+          </a:xfrm>
+          <a:prstGeom prst="roundRect">
+            <a:avLst/>
+          </a:prstGeom>
+          <a:solidFill>
+            <a:schemeClr val="bg1"/>
+          </a:solidFill>
+        </p:spPr>
+        <p:txBody>
+          <a:bodyPr wrap="square" rtlCol="0">
+            <a:spAutoFit/>
+          </a:bodyPr>
+          <a:lstStyle/>
+          <a:p>
+            <a:pPr algn="ctr"/>
+            <a:r>
+              <a:rPr lang="en-GB" sz="1400" dirty="0">
+                <a:solidFill>
+                  <a:schemeClr val="tx1">
+                    <a:lumMod val="75000"/>
+                    <a:lumOff val="25000"/>
+                  </a:schemeClr>
+                </a:solidFill>
+                <a:latin typeface="Roboto Condensed" pitchFamily="2" charset="0"/>
+                <a:ea typeface="Roboto Condensed" pitchFamily="2" charset="0"/>
+                <a:cs typeface="Arial" panose="020B0604020202020204" pitchFamily="34" charset="0"/>
+              </a:rPr>
+              <a:t>21.2</a:t>
+            </a:r>
+          </a:p>
+        </p:txBody>
+      </p:sp>
+      <p:sp>
+        <p:nvSpPr>
+          <p:cNvPr id="7" name="TextBox 6">
+            <a:extLst>
+              <a:ext uri="{FF2B5EF4-FFF2-40B4-BE49-F238E27FC236}">
+                <a16:creationId xmlns:a16="http://schemas.microsoft.com/office/drawing/2014/main" id="{6B53828A-373C-0221-E941-D7A382E36EF8}"/>
+              </a:ext>
+            </a:extLst>
+          </p:cNvPr>
+          <p:cNvSpPr txBox="1"/>
+          <p:nvPr/>
+        </p:nvSpPr>
+        <p:spPr>
+          <a:xfrm>
+            <a:off x="2836127" y="2941939"/>
+            <a:ext cx="540000" cy="324000"/>
+          </a:xfrm>
+          <a:prstGeom prst="roundRect">
+            <a:avLst/>
+          </a:prstGeom>
+          <a:solidFill>
+            <a:schemeClr val="bg1"/>
+          </a:solidFill>
+        </p:spPr>
+        <p:txBody>
+          <a:bodyPr wrap="square" rtlCol="0">
+            <a:spAutoFit/>
+          </a:bodyPr>
+          <a:lstStyle/>
+          <a:p>
+            <a:pPr algn="ctr"/>
+            <a:r>
+              <a:rPr lang="en-GB" sz="1400" dirty="0">
+                <a:solidFill>
+                  <a:schemeClr val="tx1">
+                    <a:lumMod val="75000"/>
+                    <a:lumOff val="25000"/>
+                  </a:schemeClr>
+                </a:solidFill>
+                <a:latin typeface="Roboto Condensed" pitchFamily="2" charset="0"/>
+                <a:ea typeface="Roboto Condensed" pitchFamily="2" charset="0"/>
+                <a:cs typeface="Arial" panose="020B0604020202020204" pitchFamily="34" charset="0"/>
+              </a:rPr>
+              <a:t>19.9</a:t>
+            </a:r>
+          </a:p>
+        </p:txBody>
+      </p:sp>
+      <p:sp>
+        <p:nvSpPr>
+          <p:cNvPr id="10" name="TextBox 9">
+            <a:extLst>
+              <a:ext uri="{FF2B5EF4-FFF2-40B4-BE49-F238E27FC236}">
+                <a16:creationId xmlns:a16="http://schemas.microsoft.com/office/drawing/2014/main" id="{1F111AFA-9464-62AE-0D40-5823FF0EA53E}"/>
+              </a:ext>
+            </a:extLst>
+          </p:cNvPr>
+          <p:cNvSpPr txBox="1"/>
+          <p:nvPr/>
+        </p:nvSpPr>
+        <p:spPr>
+          <a:xfrm>
+            <a:off x="3421873" y="2222275"/>
+            <a:ext cx="540000" cy="324000"/>
+          </a:xfrm>
+          <a:prstGeom prst="roundRect">
+            <a:avLst/>
+          </a:prstGeom>
+          <a:solidFill>
+            <a:schemeClr val="bg1"/>
+          </a:solidFill>
+        </p:spPr>
+        <p:txBody>
+          <a:bodyPr wrap="square" rtlCol="0">
+            <a:spAutoFit/>
+          </a:bodyPr>
+          <a:lstStyle/>
+          <a:p>
+            <a:pPr algn="ctr"/>
+            <a:r>
+              <a:rPr lang="en-GB" sz="1400" dirty="0">
+                <a:solidFill>
+                  <a:schemeClr val="tx1">
+                    <a:lumMod val="75000"/>
+                    <a:lumOff val="25000"/>
+                  </a:schemeClr>
+                </a:solidFill>
+                <a:latin typeface="Roboto Condensed" pitchFamily="2" charset="0"/>
+                <a:ea typeface="Roboto Condensed" pitchFamily="2" charset="0"/>
+                <a:cs typeface="Arial" panose="020B0604020202020204" pitchFamily="34" charset="0"/>
+              </a:rPr>
+              <a:t>20.2</a:t>
+            </a:r>
+          </a:p>
+        </p:txBody>
+      </p:sp>
+      <p:sp>
+        <p:nvSpPr>
+          <p:cNvPr id="9" name="TextBox 8">
+            <a:extLst>
+              <a:ext uri="{FF2B5EF4-FFF2-40B4-BE49-F238E27FC236}">
+                <a16:creationId xmlns:a16="http://schemas.microsoft.com/office/drawing/2014/main" id="{D8D254A5-3EA2-C9A8-2B59-6BE086F85A67}"/>
+              </a:ext>
+            </a:extLst>
+          </p:cNvPr>
+          <p:cNvSpPr txBox="1"/>
+          <p:nvPr/>
+        </p:nvSpPr>
+        <p:spPr>
+          <a:xfrm>
+            <a:off x="3999154" y="3009674"/>
+            <a:ext cx="540000" cy="324000"/>
+          </a:xfrm>
+          <a:prstGeom prst="roundRect">
+            <a:avLst/>
+          </a:prstGeom>
+          <a:solidFill>
+            <a:schemeClr val="bg1"/>
+          </a:solidFill>
+        </p:spPr>
+        <p:txBody>
+          <a:bodyPr wrap="square" rtlCol="0">
+            <a:spAutoFit/>
+          </a:bodyPr>
+          <a:lstStyle/>
+          <a:p>
+            <a:pPr algn="ctr"/>
+            <a:r>
+              <a:rPr lang="en-GB" sz="1400" dirty="0">
+                <a:solidFill>
+                  <a:schemeClr val="tx1">
+                    <a:lumMod val="75000"/>
+                    <a:lumOff val="25000"/>
+                  </a:schemeClr>
+                </a:solidFill>
+                <a:latin typeface="Roboto Condensed" pitchFamily="2" charset="0"/>
+                <a:ea typeface="Roboto Condensed" pitchFamily="2" charset="0"/>
+                <a:cs typeface="Arial" panose="020B0604020202020204" pitchFamily="34" charset="0"/>
+              </a:rPr>
+              <a:t>17.5</a:t>
+            </a:r>
+          </a:p>
+        </p:txBody>
+      </p:sp>
+      <p:sp>
+        <p:nvSpPr>
+          <p:cNvPr id="11" name="TextBox 10">
+            <a:extLst>
+              <a:ext uri="{FF2B5EF4-FFF2-40B4-BE49-F238E27FC236}">
+                <a16:creationId xmlns:a16="http://schemas.microsoft.com/office/drawing/2014/main" id="{7A739EE5-3819-3D6B-99D9-74CCDD704B3B}"/>
+              </a:ext>
+            </a:extLst>
+          </p:cNvPr>
+          <p:cNvSpPr txBox="1"/>
+          <p:nvPr/>
+        </p:nvSpPr>
+        <p:spPr>
+          <a:xfrm>
+            <a:off x="4574240" y="3974874"/>
+            <a:ext cx="540000" cy="324000"/>
+          </a:xfrm>
+          <a:prstGeom prst="roundRect">
+            <a:avLst/>
+          </a:prstGeom>
+          <a:solidFill>
+            <a:schemeClr val="bg1"/>
+          </a:solidFill>
+        </p:spPr>
+        <p:txBody>
+          <a:bodyPr wrap="square" rtlCol="0">
+            <a:spAutoFit/>
+          </a:bodyPr>
+          <a:lstStyle/>
+          <a:p>
+            <a:pPr algn="ctr"/>
+            <a:r>
+              <a:rPr lang="en-GB" sz="1400" dirty="0">
+                <a:solidFill>
+                  <a:schemeClr val="tx1">
+                    <a:lumMod val="75000"/>
+                    <a:lumOff val="25000"/>
+                  </a:schemeClr>
+                </a:solidFill>
+                <a:latin typeface="Roboto Condensed" pitchFamily="2" charset="0"/>
+                <a:ea typeface="Roboto Condensed" pitchFamily="2" charset="0"/>
+                <a:cs typeface="Arial" panose="020B0604020202020204" pitchFamily="34" charset="0"/>
+              </a:rPr>
+              <a:t>13.4</a:t>
+            </a:r>
+          </a:p>
+        </p:txBody>
+      </p:sp>
+      <p:sp>
+        <p:nvSpPr>
+          <p:cNvPr id="12" name="TextBox 11">
+            <a:extLst>
+              <a:ext uri="{FF2B5EF4-FFF2-40B4-BE49-F238E27FC236}">
+                <a16:creationId xmlns:a16="http://schemas.microsoft.com/office/drawing/2014/main" id="{4470D3B3-9D9C-3783-DD1A-B6E3EB6AFA69}"/>
+              </a:ext>
+            </a:extLst>
+          </p:cNvPr>
+          <p:cNvSpPr txBox="1"/>
+          <p:nvPr/>
+        </p:nvSpPr>
+        <p:spPr>
+          <a:xfrm>
+            <a:off x="5148357" y="3608691"/>
+            <a:ext cx="540000" cy="324000"/>
+          </a:xfrm>
+          <a:prstGeom prst="roundRect">
+            <a:avLst/>
+          </a:prstGeom>
+          <a:solidFill>
+            <a:schemeClr val="bg1"/>
+          </a:solidFill>
+        </p:spPr>
+        <p:txBody>
+          <a:bodyPr wrap="square" rtlCol="0">
+            <a:spAutoFit/>
+          </a:bodyPr>
+          <a:lstStyle/>
+          <a:p>
+            <a:pPr algn="ctr"/>
+            <a:r>
+              <a:rPr lang="en-GB" sz="1400" dirty="0">
+                <a:solidFill>
+                  <a:schemeClr val="tx1">
+                    <a:lumMod val="75000"/>
+                    <a:lumOff val="25000"/>
+                  </a:schemeClr>
+                </a:solidFill>
+                <a:latin typeface="Roboto Condensed" pitchFamily="2" charset="0"/>
+                <a:ea typeface="Roboto Condensed" pitchFamily="2" charset="0"/>
+                <a:cs typeface="Arial" panose="020B0604020202020204" pitchFamily="34" charset="0"/>
+              </a:rPr>
+              <a:t>16.2</a:t>
+            </a:r>
+          </a:p>
+        </p:txBody>
+      </p:sp>
+      <p:sp>
+        <p:nvSpPr>
+          <p:cNvPr id="13" name="TextBox 12">
+            <a:extLst>
+              <a:ext uri="{FF2B5EF4-FFF2-40B4-BE49-F238E27FC236}">
+                <a16:creationId xmlns:a16="http://schemas.microsoft.com/office/drawing/2014/main" id="{1CCA5C6F-088D-EA23-7AB2-ADA4821E9F4F}"/>
+              </a:ext>
+            </a:extLst>
+          </p:cNvPr>
+          <p:cNvSpPr txBox="1"/>
+          <p:nvPr/>
+        </p:nvSpPr>
+        <p:spPr>
+          <a:xfrm>
+            <a:off x="5725709" y="3070440"/>
+            <a:ext cx="540000" cy="324000"/>
+          </a:xfrm>
+          <a:prstGeom prst="roundRect">
+            <a:avLst/>
+          </a:prstGeom>
+          <a:solidFill>
+            <a:schemeClr val="bg1"/>
+          </a:solidFill>
+        </p:spPr>
+        <p:txBody>
+          <a:bodyPr wrap="square" rtlCol="0">
+            <a:spAutoFit/>
+          </a:bodyPr>
+          <a:lstStyle/>
+          <a:p>
+            <a:pPr algn="ctr"/>
+            <a:r>
+              <a:rPr lang="en-GB" sz="1400" dirty="0">
+                <a:solidFill>
+                  <a:schemeClr val="tx1">
+                    <a:lumMod val="75000"/>
+                    <a:lumOff val="25000"/>
+                  </a:schemeClr>
+                </a:solidFill>
+                <a:latin typeface="Roboto Condensed" pitchFamily="2" charset="0"/>
+                <a:ea typeface="Roboto Condensed" pitchFamily="2" charset="0"/>
+                <a:cs typeface="Arial" panose="020B0604020202020204" pitchFamily="34" charset="0"/>
+              </a:rPr>
+              <a:t>14.6</a:t>
+            </a:r>
+          </a:p>
+        </p:txBody>
+      </p:sp>
+      <p:sp>
+        <p:nvSpPr>
+          <p:cNvPr id="14" name="TextBox 13">
+            <a:extLst>
+              <a:ext uri="{FF2B5EF4-FFF2-40B4-BE49-F238E27FC236}">
+                <a16:creationId xmlns:a16="http://schemas.microsoft.com/office/drawing/2014/main" id="{740BD3A5-E470-617B-5F74-39734CCAA178}"/>
+              </a:ext>
+            </a:extLst>
+          </p:cNvPr>
+          <p:cNvSpPr txBox="1"/>
+          <p:nvPr/>
+        </p:nvSpPr>
+        <p:spPr>
+          <a:xfrm>
+            <a:off x="6309904" y="3245266"/>
+            <a:ext cx="540000" cy="324000"/>
+          </a:xfrm>
+          <a:prstGeom prst="roundRect">
+            <a:avLst/>
+          </a:prstGeom>
+          <a:solidFill>
+            <a:schemeClr val="bg1"/>
+          </a:solidFill>
+        </p:spPr>
+        <p:txBody>
+          <a:bodyPr wrap="square" rtlCol="0">
+            <a:spAutoFit/>
+          </a:bodyPr>
+          <a:lstStyle/>
+          <a:p>
+            <a:pPr algn="ctr"/>
+            <a:r>
+              <a:rPr lang="en-GB" sz="1400" dirty="0">
+                <a:solidFill>
+                  <a:schemeClr val="tx1">
+                    <a:lumMod val="75000"/>
+                    <a:lumOff val="25000"/>
+                  </a:schemeClr>
+                </a:solidFill>
+                <a:latin typeface="Roboto Condensed" pitchFamily="2" charset="0"/>
+                <a:ea typeface="Roboto Condensed" pitchFamily="2" charset="0"/>
+                <a:cs typeface="Arial" panose="020B0604020202020204" pitchFamily="34" charset="0"/>
+              </a:rPr>
+              <a:t>15.7</a:t>
+            </a:r>
+          </a:p>
+        </p:txBody>
+      </p:sp>
+      <p:sp>
+        <p:nvSpPr>
+          <p:cNvPr id="15" name="TextBox 14">
+            <a:extLst>
+              <a:ext uri="{FF2B5EF4-FFF2-40B4-BE49-F238E27FC236}">
+                <a16:creationId xmlns:a16="http://schemas.microsoft.com/office/drawing/2014/main" id="{C4572763-7E67-C133-75A3-E8F495520B2E}"/>
+              </a:ext>
+            </a:extLst>
+          </p:cNvPr>
+          <p:cNvSpPr txBox="1"/>
+          <p:nvPr/>
+        </p:nvSpPr>
+        <p:spPr>
+          <a:xfrm>
+            <a:off x="6868706" y="3507545"/>
+            <a:ext cx="540000" cy="324000"/>
+          </a:xfrm>
+          <a:prstGeom prst="roundRect">
+            <a:avLst/>
+          </a:prstGeom>
+          <a:solidFill>
+            <a:schemeClr val="bg1"/>
+          </a:solidFill>
+        </p:spPr>
+        <p:txBody>
+          <a:bodyPr wrap="square" rtlCol="0">
+            <a:spAutoFit/>
+          </a:bodyPr>
+          <a:lstStyle/>
+          <a:p>
+            <a:pPr algn="ctr"/>
+            <a:r>
+              <a:rPr lang="en-GB" sz="1400" dirty="0">
+                <a:solidFill>
+                  <a:schemeClr val="tx1">
+                    <a:lumMod val="75000"/>
+                    <a:lumOff val="25000"/>
+                  </a:schemeClr>
+                </a:solidFill>
+                <a:latin typeface="Roboto Condensed" pitchFamily="2" charset="0"/>
+                <a:ea typeface="Roboto Condensed" pitchFamily="2" charset="0"/>
+                <a:cs typeface="Arial" panose="020B0604020202020204" pitchFamily="34" charset="0"/>
+              </a:rPr>
+              <a:t>18.6</a:t>
+            </a:r>
+          </a:p>
+        </p:txBody>
+      </p:sp>
+      <p:sp>
+        <p:nvSpPr>
+          <p:cNvPr id="16" name="TextBox 15">
+            <a:extLst>
+              <a:ext uri="{FF2B5EF4-FFF2-40B4-BE49-F238E27FC236}">
+                <a16:creationId xmlns:a16="http://schemas.microsoft.com/office/drawing/2014/main" id="{CFD6FCF1-24E6-449C-212B-7213537BD4AC}"/>
+              </a:ext>
+            </a:extLst>
+          </p:cNvPr>
+          <p:cNvSpPr txBox="1"/>
+          <p:nvPr/>
+        </p:nvSpPr>
+        <p:spPr>
+          <a:xfrm>
+            <a:off x="7444942" y="3633644"/>
+            <a:ext cx="540000" cy="324000"/>
+          </a:xfrm>
+          <a:prstGeom prst="roundRect">
+            <a:avLst/>
+          </a:prstGeom>
+          <a:solidFill>
+            <a:schemeClr val="bg1"/>
+          </a:solidFill>
+        </p:spPr>
+        <p:txBody>
+          <a:bodyPr wrap="square" rtlCol="0">
+            <a:spAutoFit/>
+          </a:bodyPr>
+          <a:lstStyle/>
+          <a:p>
+            <a:pPr algn="ctr"/>
+            <a:r>
+              <a:rPr lang="en-GB" sz="1400" dirty="0">
+                <a:solidFill>
+                  <a:schemeClr val="tx1">
+                    <a:lumMod val="75000"/>
+                    <a:lumOff val="25000"/>
+                  </a:schemeClr>
+                </a:solidFill>
+                <a:latin typeface="Roboto Condensed" pitchFamily="2" charset="0"/>
+                <a:ea typeface="Roboto Condensed" pitchFamily="2" charset="0"/>
+                <a:cs typeface="Arial" panose="020B0604020202020204" pitchFamily="34" charset="0"/>
+              </a:rPr>
+              <a:t>18.2</a:t>
+            </a:r>
+          </a:p>
+        </p:txBody>
+      </p:sp>
+      <p:sp>
+        <p:nvSpPr>
+          <p:cNvPr id="17" name="TextBox 16">
+            <a:extLst>
+              <a:ext uri="{FF2B5EF4-FFF2-40B4-BE49-F238E27FC236}">
+                <a16:creationId xmlns:a16="http://schemas.microsoft.com/office/drawing/2014/main" id="{2F4BEB72-8E81-EAB3-1E4C-4B1832528204}"/>
+              </a:ext>
+            </a:extLst>
+          </p:cNvPr>
+          <p:cNvSpPr txBox="1"/>
+          <p:nvPr/>
+        </p:nvSpPr>
+        <p:spPr>
+          <a:xfrm>
+            <a:off x="8025410" y="3178373"/>
+            <a:ext cx="540000" cy="324000"/>
+          </a:xfrm>
+          <a:prstGeom prst="roundRect">
+            <a:avLst/>
+          </a:prstGeom>
+          <a:solidFill>
+            <a:schemeClr val="bg1"/>
+          </a:solidFill>
+        </p:spPr>
+        <p:txBody>
+          <a:bodyPr wrap="square" rtlCol="0">
+            <a:spAutoFit/>
+          </a:bodyPr>
+          <a:lstStyle/>
+          <a:p>
+            <a:pPr algn="ctr"/>
+            <a:r>
+              <a:rPr lang="en-GB" sz="1400" dirty="0">
+                <a:solidFill>
+                  <a:schemeClr val="tx1">
+                    <a:lumMod val="75000"/>
+                    <a:lumOff val="25000"/>
+                  </a:schemeClr>
+                </a:solidFill>
+                <a:latin typeface="Roboto Condensed" pitchFamily="2" charset="0"/>
+                <a:ea typeface="Roboto Condensed" pitchFamily="2" charset="0"/>
+                <a:cs typeface="Arial" panose="020B0604020202020204" pitchFamily="34" charset="0"/>
+              </a:rPr>
+              <a:t>17.4</a:t>
+            </a:r>
+          </a:p>
+        </p:txBody>
+      </p:sp>
+      <p:sp>
+        <p:nvSpPr>
+          <p:cNvPr id="33" name="TextBox 32">
+            <a:extLst>
+              <a:ext uri="{FF2B5EF4-FFF2-40B4-BE49-F238E27FC236}">
+                <a16:creationId xmlns:a16="http://schemas.microsoft.com/office/drawing/2014/main" id="{5D6F1DDE-5D0B-0821-6C03-50040F4F92BA}"/>
+              </a:ext>
+            </a:extLst>
+          </p:cNvPr>
+          <p:cNvSpPr txBox="1"/>
+          <p:nvPr/>
+        </p:nvSpPr>
+        <p:spPr>
+          <a:xfrm>
+            <a:off x="4410197" y="1824456"/>
+            <a:ext cx="1612898" cy="523220"/>
+          </a:xfrm>
+          <a:prstGeom prst="rect">
+            <a:avLst/>
+          </a:prstGeom>
+          <a:noFill/>
+        </p:spPr>
+        <p:txBody>
+          <a:bodyPr wrap="square" rtlCol="0">
+            <a:spAutoFit/>
+          </a:bodyPr>
+          <a:lstStyle/>
+          <a:p>
+            <a:pPr algn="r"/>
+            <a:r>
+              <a:rPr lang="en-GB" sz="2800" dirty="0">
+                <a:solidFill>
+                  <a:srgbClr val="FF0000"/>
+                </a:solidFill>
+                <a:latin typeface="Roboto Condensed" pitchFamily="2" charset="0"/>
+                <a:ea typeface="Roboto Condensed" pitchFamily="2" charset="0"/>
+              </a:rPr>
+              <a:t>Lambeth</a:t>
+            </a:r>
+            <a:endParaRPr lang="en-GB" dirty="0">
+              <a:solidFill>
+                <a:srgbClr val="FF0000"/>
+              </a:solidFill>
+              <a:latin typeface="Roboto Condensed" pitchFamily="2" charset="0"/>
+              <a:ea typeface="Roboto Condensed" pitchFamily="2" charset="0"/>
+            </a:endParaRPr>
+          </a:p>
+        </p:txBody>
+      </p:sp>
+      <p:sp>
+        <p:nvSpPr>
+          <p:cNvPr id="34" name="TextBox 33">
+            <a:extLst>
+              <a:ext uri="{FF2B5EF4-FFF2-40B4-BE49-F238E27FC236}">
+                <a16:creationId xmlns:a16="http://schemas.microsoft.com/office/drawing/2014/main" id="{3538B574-EE9D-8452-5842-8E461DB8B38D}"/>
+              </a:ext>
+            </a:extLst>
+          </p:cNvPr>
+          <p:cNvSpPr txBox="1"/>
+          <p:nvPr/>
+        </p:nvSpPr>
+        <p:spPr>
+          <a:xfrm>
+            <a:off x="2427860" y="4202136"/>
+            <a:ext cx="1896534" cy="523220"/>
+          </a:xfrm>
+          <a:prstGeom prst="rect">
+            <a:avLst/>
+          </a:prstGeom>
+          <a:noFill/>
+        </p:spPr>
+        <p:txBody>
+          <a:bodyPr wrap="square" rtlCol="0">
+            <a:spAutoFit/>
+          </a:bodyPr>
+          <a:lstStyle/>
+          <a:p>
+            <a:pPr algn="r"/>
+            <a:r>
+              <a:rPr lang="en-GB" sz="2800" dirty="0">
+                <a:solidFill>
+                  <a:srgbClr val="0432FF"/>
+                </a:solidFill>
+                <a:latin typeface="Roboto Condensed" pitchFamily="2" charset="0"/>
+                <a:ea typeface="Roboto Condensed" pitchFamily="2" charset="0"/>
+              </a:rPr>
+              <a:t>Havering</a:t>
+            </a:r>
+          </a:p>
+        </p:txBody>
+      </p:sp>
+      <p:grpSp>
+        <p:nvGrpSpPr>
+          <p:cNvPr id="36" name="그룹 35">
+            <a:extLst>
+              <a:ext uri="{FF2B5EF4-FFF2-40B4-BE49-F238E27FC236}">
+                <a16:creationId xmlns:a16="http://schemas.microsoft.com/office/drawing/2014/main" id="{60186C8A-0A0A-7243-4F31-595B9C1B77E2}"/>
+              </a:ext>
+            </a:extLst>
+          </p:cNvPr>
+          <p:cNvGrpSpPr/>
+          <p:nvPr/>
+        </p:nvGrpSpPr>
+        <p:grpSpPr>
+          <a:xfrm>
+            <a:off x="8017527" y="4991818"/>
+            <a:ext cx="518160" cy="467360"/>
+            <a:chOff x="4836160" y="3606800"/>
+            <a:chExt cx="518160" cy="467360"/>
+          </a:xfrm>
+        </p:grpSpPr>
+        <p:pic>
+          <p:nvPicPr>
+            <p:cNvPr id="37" name="그림 36">
+              <a:extLst>
+                <a:ext uri="{FF2B5EF4-FFF2-40B4-BE49-F238E27FC236}">
+                  <a16:creationId xmlns:a16="http://schemas.microsoft.com/office/drawing/2014/main" id="{09E5DA2E-6800-239A-84D7-71559359397D}"/>
+                </a:ext>
+              </a:extLst>
+            </p:cNvPr>
+            <p:cNvPicPr>
+              <a:picLocks noChangeAspect="1"/>
+            </p:cNvPicPr>
+            <p:nvPr/>
+          </p:nvPicPr>
+          <p:blipFill rotWithShape="1">
+            <a:blip r:embed="rId2"/>
+            <a:srcRect l="69096" t="83333" r="24238" b="7647"/>
+            <a:stretch/>
+          </p:blipFill>
+          <p:spPr>
+            <a:xfrm>
+              <a:off x="4836160" y="3606800"/>
+              <a:ext cx="518160" cy="467360"/>
+            </a:xfrm>
+            <a:prstGeom prst="rect">
+              <a:avLst/>
+            </a:prstGeom>
+          </p:spPr>
+        </p:pic>
+        <p:pic>
+          <p:nvPicPr>
+            <p:cNvPr id="38" name="그림 37">
+              <a:extLst>
+                <a:ext uri="{FF2B5EF4-FFF2-40B4-BE49-F238E27FC236}">
+                  <a16:creationId xmlns:a16="http://schemas.microsoft.com/office/drawing/2014/main" id="{EC8C706D-E763-E19E-F44E-2CD9EAF2C94B}"/>
+                </a:ext>
+              </a:extLst>
+            </p:cNvPr>
+            <p:cNvPicPr>
+              <a:picLocks noChangeAspect="1"/>
+            </p:cNvPicPr>
+            <p:nvPr/>
+          </p:nvPicPr>
+          <p:blipFill rotWithShape="1">
+            <a:blip r:embed="rId2"/>
+            <a:srcRect l="69457" t="88011" r="28924" b="7647"/>
+            <a:stretch/>
+          </p:blipFill>
+          <p:spPr>
+            <a:xfrm>
+              <a:off x="5228485" y="3849149"/>
+              <a:ext cx="125835" cy="225011"/>
+            </a:xfrm>
+            <a:prstGeom prst="rect">
+              <a:avLst/>
+            </a:prstGeom>
+          </p:spPr>
+        </p:pic>
+      </p:grpSp>
     </p:spTree>
     <p:extLst>
       <p:ext uri="{BB962C8B-B14F-4D97-AF65-F5344CB8AC3E}">
         <p14:creationId xmlns:p14="http://schemas.microsoft.com/office/powerpoint/2010/main" val="3788596064"/>
+      </p:ext>
+    </p:extLst>
+  </p:cSld>
+  <p:clrMapOvr>
+    <a:masterClrMapping/>
+  </p:clrMapOvr>
+</p:sld>
+</file>
+
+<file path=ppt/slides/slide3.xml><?xml version="1.0" encoding="utf-8"?>
+<p:sld xmlns:a="http://schemas.openxmlformats.org/drawingml/2006/main" xmlns:r="http://schemas.openxmlformats.org/officeDocument/2006/relationships" xmlns:p="http://schemas.openxmlformats.org/presentationml/2006/main">
+  <p:cSld>
+    <p:spTree>
+      <p:nvGrpSpPr>
+        <p:cNvPr id="1" name=""/>
+        <p:cNvGrpSpPr/>
+        <p:nvPr/>
+      </p:nvGrpSpPr>
+      <p:grpSpPr>
+        <a:xfrm>
+          <a:off x="0" y="0"/>
+          <a:ext cx="0" cy="0"/>
+          <a:chOff x="0" y="0"/>
+          <a:chExt cx="0" cy="0"/>
+        </a:xfrm>
+      </p:grpSpPr>
+      <p:pic>
+        <p:nvPicPr>
+          <p:cNvPr id="6" name="그림 5" descr="텍스트, 라인, 그래프, 도표이(가) 표시된 사진&#10;&#10;자동 생성된 설명">
+            <a:extLst>
+              <a:ext uri="{FF2B5EF4-FFF2-40B4-BE49-F238E27FC236}">
+                <a16:creationId xmlns:a16="http://schemas.microsoft.com/office/drawing/2014/main" id="{2D9C6DF9-9CFB-3308-2D3B-B742D1F15429}"/>
+              </a:ext>
+            </a:extLst>
+          </p:cNvPr>
+          <p:cNvPicPr>
+            <a:picLocks noChangeAspect="1"/>
+          </p:cNvPicPr>
+          <p:nvPr/>
+        </p:nvPicPr>
+        <p:blipFill>
+          <a:blip r:embed="rId2"/>
+          <a:stretch>
+            <a:fillRect/>
+          </a:stretch>
+        </p:blipFill>
+        <p:spPr>
+          <a:xfrm>
+            <a:off x="1881351" y="1701800"/>
+            <a:ext cx="7772400" cy="3454400"/>
+          </a:xfrm>
+          <a:prstGeom prst="rect">
+            <a:avLst/>
+          </a:prstGeom>
+        </p:spPr>
+      </p:pic>
+      <p:pic>
+        <p:nvPicPr>
+          <p:cNvPr id="8" name="그림 7" descr="텍스트, 폰트, 화이트, 디자인이(가) 표시된 사진&#10;&#10;자동 생성된 설명">
+            <a:extLst>
+              <a:ext uri="{FF2B5EF4-FFF2-40B4-BE49-F238E27FC236}">
+                <a16:creationId xmlns:a16="http://schemas.microsoft.com/office/drawing/2014/main" id="{F0EFC90A-77C5-E03A-E87C-A536F1CBA011}"/>
+              </a:ext>
+            </a:extLst>
+          </p:cNvPr>
+          <p:cNvPicPr>
+            <a:picLocks noChangeAspect="1"/>
+          </p:cNvPicPr>
+          <p:nvPr/>
+        </p:nvPicPr>
+        <p:blipFill>
+          <a:blip r:embed="rId3"/>
+          <a:stretch>
+            <a:fillRect/>
+          </a:stretch>
+        </p:blipFill>
+        <p:spPr>
+          <a:xfrm>
+            <a:off x="9653751" y="3788979"/>
+            <a:ext cx="838638" cy="749421"/>
+          </a:xfrm>
+          <a:prstGeom prst="rect">
+            <a:avLst/>
+          </a:prstGeom>
+        </p:spPr>
+      </p:pic>
+    </p:spTree>
+    <p:extLst>
+      <p:ext uri="{BB962C8B-B14F-4D97-AF65-F5344CB8AC3E}">
+        <p14:creationId xmlns:p14="http://schemas.microsoft.com/office/powerpoint/2010/main" val="817957215"/>
       </p:ext>
     </p:extLst>
   </p:cSld>

</xml_diff>